<commit_message>
Corrette alcune cose nella presentazione
</commit_message>
<xml_diff>
--- a/RR/Esterni/Presentazione/Presentazione.pptx
+++ b/RR/Esterni/Presentazione/Presentazione.pptx
@@ -20826,6 +20826,36 @@
           <a:chExt cx="0" cy="0"/>
         </a:xfrm>
       </p:grpSpPr>
+      <p:pic>
+        <p:nvPicPr>
+          <p:cNvPr id="6" name="Immagine 5"/>
+          <p:cNvPicPr>
+            <a:picLocks noChangeAspect="1"/>
+          </p:cNvPicPr>
+          <p:nvPr/>
+        </p:nvPicPr>
+        <p:blipFill>
+          <a:blip r:embed="rId2" cstate="print">
+            <a:extLst>
+              <a:ext uri="{28A0092B-C50C-407E-A947-70E740481C1C}">
+                <a14:useLocalDpi xmlns:a14="http://schemas.microsoft.com/office/drawing/2010/main" val="0"/>
+              </a:ext>
+            </a:extLst>
+          </a:blip>
+          <a:stretch>
+            <a:fillRect/>
+          </a:stretch>
+        </p:blipFill>
+        <p:spPr>
+          <a:xfrm>
+            <a:off x="2750630" y="1268760"/>
+            <a:ext cx="3765586" cy="4581128"/>
+          </a:xfrm>
+          <a:prstGeom prst="rect">
+            <a:avLst/>
+          </a:prstGeom>
+        </p:spPr>
+      </p:pic>
       <p:sp>
         <p:nvSpPr>
           <p:cNvPr id="2" name="Titolo 1"/>
@@ -21011,6 +21041,36 @@
           <a:chExt cx="0" cy="0"/>
         </a:xfrm>
       </p:grpSpPr>
+      <p:pic>
+        <p:nvPicPr>
+          <p:cNvPr id="6" name="Immagine 5"/>
+          <p:cNvPicPr>
+            <a:picLocks noChangeAspect="1"/>
+          </p:cNvPicPr>
+          <p:nvPr/>
+        </p:nvPicPr>
+        <p:blipFill>
+          <a:blip r:embed="rId2" cstate="print">
+            <a:extLst>
+              <a:ext uri="{28A0092B-C50C-407E-A947-70E740481C1C}">
+                <a14:useLocalDpi xmlns:a14="http://schemas.microsoft.com/office/drawing/2010/main" val="0"/>
+              </a:ext>
+            </a:extLst>
+          </a:blip>
+          <a:stretch>
+            <a:fillRect/>
+          </a:stretch>
+        </p:blipFill>
+        <p:spPr>
+          <a:xfrm>
+            <a:off x="2750630" y="1268760"/>
+            <a:ext cx="3765586" cy="4581128"/>
+          </a:xfrm>
+          <a:prstGeom prst="rect">
+            <a:avLst/>
+          </a:prstGeom>
+        </p:spPr>
+      </p:pic>
       <p:sp>
         <p:nvSpPr>
           <p:cNvPr id="2" name="Titolo 1"/>
@@ -21207,6 +21267,36 @@
           <a:chExt cx="0" cy="0"/>
         </a:xfrm>
       </p:grpSpPr>
+      <p:pic>
+        <p:nvPicPr>
+          <p:cNvPr id="6" name="Immagine 5"/>
+          <p:cNvPicPr>
+            <a:picLocks noChangeAspect="1"/>
+          </p:cNvPicPr>
+          <p:nvPr/>
+        </p:nvPicPr>
+        <p:blipFill>
+          <a:blip r:embed="rId2" cstate="print">
+            <a:extLst>
+              <a:ext uri="{28A0092B-C50C-407E-A947-70E740481C1C}">
+                <a14:useLocalDpi xmlns:a14="http://schemas.microsoft.com/office/drawing/2010/main" val="0"/>
+              </a:ext>
+            </a:extLst>
+          </a:blip>
+          <a:stretch>
+            <a:fillRect/>
+          </a:stretch>
+        </p:blipFill>
+        <p:spPr>
+          <a:xfrm>
+            <a:off x="2750630" y="1268760"/>
+            <a:ext cx="3765586" cy="4581128"/>
+          </a:xfrm>
+          <a:prstGeom prst="rect">
+            <a:avLst/>
+          </a:prstGeom>
+        </p:spPr>
+      </p:pic>
       <p:sp>
         <p:nvSpPr>
           <p:cNvPr id="2" name="Titolo 1"/>
@@ -21536,6 +21626,36 @@
           <a:chExt cx="0" cy="0"/>
         </a:xfrm>
       </p:grpSpPr>
+      <p:pic>
+        <p:nvPicPr>
+          <p:cNvPr id="6" name="Immagine 5"/>
+          <p:cNvPicPr>
+            <a:picLocks noChangeAspect="1"/>
+          </p:cNvPicPr>
+          <p:nvPr/>
+        </p:nvPicPr>
+        <p:blipFill>
+          <a:blip r:embed="rId2" cstate="print">
+            <a:extLst>
+              <a:ext uri="{28A0092B-C50C-407E-A947-70E740481C1C}">
+                <a14:useLocalDpi xmlns:a14="http://schemas.microsoft.com/office/drawing/2010/main" val="0"/>
+              </a:ext>
+            </a:extLst>
+          </a:blip>
+          <a:stretch>
+            <a:fillRect/>
+          </a:stretch>
+        </p:blipFill>
+        <p:spPr>
+          <a:xfrm>
+            <a:off x="2750630" y="1268760"/>
+            <a:ext cx="3765586" cy="4581128"/>
+          </a:xfrm>
+          <a:prstGeom prst="rect">
+            <a:avLst/>
+          </a:prstGeom>
+        </p:spPr>
+      </p:pic>
       <p:sp>
         <p:nvSpPr>
           <p:cNvPr id="2" name="Titolo 1"/>
@@ -21710,6 +21830,36 @@
           <a:chExt cx="0" cy="0"/>
         </a:xfrm>
       </p:grpSpPr>
+      <p:pic>
+        <p:nvPicPr>
+          <p:cNvPr id="6" name="Immagine 5"/>
+          <p:cNvPicPr>
+            <a:picLocks noChangeAspect="1"/>
+          </p:cNvPicPr>
+          <p:nvPr/>
+        </p:nvPicPr>
+        <p:blipFill>
+          <a:blip r:embed="rId2" cstate="print">
+            <a:extLst>
+              <a:ext uri="{28A0092B-C50C-407E-A947-70E740481C1C}">
+                <a14:useLocalDpi xmlns:a14="http://schemas.microsoft.com/office/drawing/2010/main" val="0"/>
+              </a:ext>
+            </a:extLst>
+          </a:blip>
+          <a:stretch>
+            <a:fillRect/>
+          </a:stretch>
+        </p:blipFill>
+        <p:spPr>
+          <a:xfrm>
+            <a:off x="2750630" y="1268760"/>
+            <a:ext cx="3765586" cy="4581128"/>
+          </a:xfrm>
+          <a:prstGeom prst="rect">
+            <a:avLst/>
+          </a:prstGeom>
+        </p:spPr>
+      </p:pic>
       <p:sp>
         <p:nvSpPr>
           <p:cNvPr id="2" name="Titolo 1"/>
@@ -21941,6 +22091,36 @@
           <a:chExt cx="0" cy="0"/>
         </a:xfrm>
       </p:grpSpPr>
+      <p:pic>
+        <p:nvPicPr>
+          <p:cNvPr id="6" name="Immagine 5"/>
+          <p:cNvPicPr>
+            <a:picLocks noChangeAspect="1"/>
+          </p:cNvPicPr>
+          <p:nvPr/>
+        </p:nvPicPr>
+        <p:blipFill>
+          <a:blip r:embed="rId2" cstate="print">
+            <a:extLst>
+              <a:ext uri="{28A0092B-C50C-407E-A947-70E740481C1C}">
+                <a14:useLocalDpi xmlns:a14="http://schemas.microsoft.com/office/drawing/2010/main" val="0"/>
+              </a:ext>
+            </a:extLst>
+          </a:blip>
+          <a:stretch>
+            <a:fillRect/>
+          </a:stretch>
+        </p:blipFill>
+        <p:spPr>
+          <a:xfrm>
+            <a:off x="2750630" y="1268760"/>
+            <a:ext cx="3765586" cy="4581128"/>
+          </a:xfrm>
+          <a:prstGeom prst="rect">
+            <a:avLst/>
+          </a:prstGeom>
+        </p:spPr>
+      </p:pic>
       <p:sp>
         <p:nvSpPr>
           <p:cNvPr id="2" name="Titolo 1"/>
@@ -22182,6 +22362,36 @@
           <a:chExt cx="0" cy="0"/>
         </a:xfrm>
       </p:grpSpPr>
+      <p:pic>
+        <p:nvPicPr>
+          <p:cNvPr id="6" name="Immagine 5"/>
+          <p:cNvPicPr>
+            <a:picLocks noChangeAspect="1"/>
+          </p:cNvPicPr>
+          <p:nvPr/>
+        </p:nvPicPr>
+        <p:blipFill>
+          <a:blip r:embed="rId2" cstate="print">
+            <a:extLst>
+              <a:ext uri="{28A0092B-C50C-407E-A947-70E740481C1C}">
+                <a14:useLocalDpi xmlns:a14="http://schemas.microsoft.com/office/drawing/2010/main" val="0"/>
+              </a:ext>
+            </a:extLst>
+          </a:blip>
+          <a:stretch>
+            <a:fillRect/>
+          </a:stretch>
+        </p:blipFill>
+        <p:spPr>
+          <a:xfrm>
+            <a:off x="2750630" y="1268760"/>
+            <a:ext cx="3765586" cy="4581128"/>
+          </a:xfrm>
+          <a:prstGeom prst="rect">
+            <a:avLst/>
+          </a:prstGeom>
+        </p:spPr>
+      </p:pic>
       <p:sp>
         <p:nvSpPr>
           <p:cNvPr id="2" name="Titolo 1"/>

</xml_diff>

<commit_message>
Creata la cartella per la Revisione di Progettazione (RP). Apertura dei ticket corrispondenti
</commit_message>
<xml_diff>
--- a/RR/Esterni/Presentazione/Presentazione.pptx
+++ b/RR/Esterni/Presentazione/Presentazione.pptx
@@ -24924,8 +24924,17 @@
             </a:pPr>
             <a:r>
               <a:rPr lang="it-IT" dirty="0"/>
-              <a:t>Utili a regolamentare a regolamentare:</a:t>
-            </a:r>
+              <a:t>Utili </a:t>
+            </a:r>
+            <a:r>
+              <a:rPr lang="it-IT"/>
+              <a:t>a </a:t>
+            </a:r>
+            <a:r>
+              <a:rPr lang="it-IT" smtClean="0"/>
+              <a:t>regolamentare:</a:t>
+            </a:r>
+            <a:endParaRPr lang="it-IT" dirty="0"/>
           </a:p>
           <a:p>
             <a:pPr indent="-342900" algn="just">

</xml_diff>